<commit_message>
Create Feed Screenshots ergänzt
</commit_message>
<xml_diff>
--- a/PES.pptx
+++ b/PES.pptx
@@ -25,10 +25,12 @@
     <p:sldId id="264" r:id="rId19"/>
     <p:sldId id="267" r:id="rId20"/>
     <p:sldId id="268" r:id="rId21"/>
-    <p:sldId id="269" r:id="rId22"/>
-    <p:sldId id="275" r:id="rId23"/>
-    <p:sldId id="276" r:id="rId24"/>
-    <p:sldId id="263" r:id="rId25"/>
+    <p:sldId id="280" r:id="rId22"/>
+    <p:sldId id="281" r:id="rId23"/>
+    <p:sldId id="269" r:id="rId24"/>
+    <p:sldId id="275" r:id="rId25"/>
+    <p:sldId id="276" r:id="rId26"/>
+    <p:sldId id="263" r:id="rId27"/>
   </p:sldIdLst>
   <p:sldSz cx="12192000" cy="6858000"/>
   <p:notesSz cx="6858000" cy="9144000"/>
@@ -298,7 +300,7 @@
           <a:p>
             <a:fld id="{86EDB6B8-2465-4E54-AD90-CE977215BECC}" type="datetimeFigureOut">
               <a:rPr lang="de-DE" smtClean="0"/>
-              <a:t>08.11.2016</a:t>
+              <a:t>09.11.2016</a:t>
             </a:fld>
             <a:endParaRPr lang="de-DE"/>
           </a:p>
@@ -468,7 +470,7 @@
           <a:p>
             <a:fld id="{86EDB6B8-2465-4E54-AD90-CE977215BECC}" type="datetimeFigureOut">
               <a:rPr lang="de-DE" smtClean="0"/>
-              <a:t>08.11.2016</a:t>
+              <a:t>09.11.2016</a:t>
             </a:fld>
             <a:endParaRPr lang="de-DE"/>
           </a:p>
@@ -648,7 +650,7 @@
           <a:p>
             <a:fld id="{86EDB6B8-2465-4E54-AD90-CE977215BECC}" type="datetimeFigureOut">
               <a:rPr lang="de-DE" smtClean="0"/>
-              <a:t>08.11.2016</a:t>
+              <a:t>09.11.2016</a:t>
             </a:fld>
             <a:endParaRPr lang="de-DE"/>
           </a:p>
@@ -881,7 +883,7 @@
             <a:fld id="{86EDB6B8-2465-4E54-AD90-CE977215BECC}" type="datetimeFigureOut">
               <a:rPr lang="de-DE" smtClean="0"/>
               <a:pPr/>
-              <a:t>08.11.2016</a:t>
+              <a:t>09.11.2016</a:t>
             </a:fld>
             <a:endParaRPr lang="de-DE"/>
           </a:p>
@@ -1207,7 +1209,7 @@
           <a:p>
             <a:fld id="{86EDB6B8-2465-4E54-AD90-CE977215BECC}" type="datetimeFigureOut">
               <a:rPr lang="de-DE" smtClean="0"/>
-              <a:t>08.11.2016</a:t>
+              <a:t>09.11.2016</a:t>
             </a:fld>
             <a:endParaRPr lang="de-DE"/>
           </a:p>
@@ -1439,7 +1441,7 @@
           <a:p>
             <a:fld id="{86EDB6B8-2465-4E54-AD90-CE977215BECC}" type="datetimeFigureOut">
               <a:rPr lang="de-DE" smtClean="0"/>
-              <a:t>08.11.2016</a:t>
+              <a:t>09.11.2016</a:t>
             </a:fld>
             <a:endParaRPr lang="de-DE"/>
           </a:p>
@@ -1798,7 +1800,7 @@
           <a:p>
             <a:fld id="{86EDB6B8-2465-4E54-AD90-CE977215BECC}" type="datetimeFigureOut">
               <a:rPr lang="de-DE" smtClean="0"/>
-              <a:t>08.11.2016</a:t>
+              <a:t>09.11.2016</a:t>
             </a:fld>
             <a:endParaRPr lang="de-DE"/>
           </a:p>
@@ -1939,7 +1941,7 @@
           <a:p>
             <a:fld id="{86EDB6B8-2465-4E54-AD90-CE977215BECC}" type="datetimeFigureOut">
               <a:rPr lang="de-DE" smtClean="0"/>
-              <a:t>08.11.2016</a:t>
+              <a:t>09.11.2016</a:t>
             </a:fld>
             <a:endParaRPr lang="de-DE"/>
           </a:p>
@@ -2034,7 +2036,7 @@
           <a:p>
             <a:fld id="{86EDB6B8-2465-4E54-AD90-CE977215BECC}" type="datetimeFigureOut">
               <a:rPr lang="de-DE" smtClean="0"/>
-              <a:t>08.11.2016</a:t>
+              <a:t>09.11.2016</a:t>
             </a:fld>
             <a:endParaRPr lang="de-DE"/>
           </a:p>
@@ -2391,7 +2393,7 @@
           <a:p>
             <a:fld id="{86EDB6B8-2465-4E54-AD90-CE977215BECC}" type="datetimeFigureOut">
               <a:rPr lang="de-DE" smtClean="0"/>
-              <a:t>08.11.2016</a:t>
+              <a:t>09.11.2016</a:t>
             </a:fld>
             <a:endParaRPr lang="de-DE"/>
           </a:p>
@@ -2748,7 +2750,7 @@
           <a:p>
             <a:fld id="{86EDB6B8-2465-4E54-AD90-CE977215BECC}" type="datetimeFigureOut">
               <a:rPr lang="de-DE" smtClean="0"/>
-              <a:t>08.11.2016</a:t>
+              <a:t>09.11.2016</a:t>
             </a:fld>
             <a:endParaRPr lang="de-DE"/>
           </a:p>
@@ -2989,7 +2991,7 @@
           <a:p>
             <a:fld id="{86EDB6B8-2465-4E54-AD90-CE977215BECC}" type="datetimeFigureOut">
               <a:rPr lang="de-DE" smtClean="0"/>
-              <a:t>08.11.2016</a:t>
+              <a:t>09.11.2016</a:t>
             </a:fld>
             <a:endParaRPr lang="de-DE"/>
           </a:p>
@@ -5678,6 +5680,13 @@
   <p:clrMapOvr>
     <a:masterClrMapping/>
   </p:clrMapOvr>
+  <p:timing>
+    <p:tnLst>
+      <p:par>
+        <p:cTn id="1" dur="indefinite" restart="never" nodeType="tmRoot"/>
+      </p:par>
+    </p:tnLst>
+  </p:timing>
 </p:sld>
 </file>
 
@@ -5756,11 +5765,11 @@
   <p:clrMapOvr>
     <a:masterClrMapping/>
   </p:clrMapOvr>
-  <mc:AlternateContent xmlns:mc="http://schemas.openxmlformats.org/markup-compatibility/2006">
-    <mc:Choice xmlns:p14="http://schemas.microsoft.com/office/powerpoint/2010/main" Requires="p14">
+  <mc:AlternateContent xmlns:mc="http://schemas.openxmlformats.org/markup-compatibility/2006" xmlns:p14="http://schemas.microsoft.com/office/powerpoint/2010/main">
+    <mc:Choice Requires="p14">
       <p:transition spd="slow" p14:dur="2000"/>
     </mc:Choice>
-    <mc:Fallback>
+    <mc:Fallback xmlns="">
       <p:transition spd="slow"/>
     </mc:Fallback>
   </mc:AlternateContent>
@@ -6674,6 +6683,320 @@
           <a:lstStyle/>
           <a:p>
             <a:r>
+              <a:rPr lang="de-DE" dirty="0" smtClean="0"/>
+              <a:t>Create - Feed</a:t>
+            </a:r>
+            <a:endParaRPr lang="de-DE" dirty="0"/>
+          </a:p>
+        </p:txBody>
+      </p:sp>
+      <p:pic>
+        <p:nvPicPr>
+          <p:cNvPr id="4" name="Inhaltsplatzhalter 3"/>
+          <p:cNvPicPr>
+            <a:picLocks noGrp="1" noChangeAspect="1"/>
+          </p:cNvPicPr>
+          <p:nvPr>
+            <p:ph idx="1"/>
+          </p:nvPr>
+        </p:nvPicPr>
+        <p:blipFill>
+          <a:blip r:embed="rId2"/>
+          <a:stretch>
+            <a:fillRect/>
+          </a:stretch>
+        </p:blipFill>
+        <p:spPr>
+          <a:xfrm>
+            <a:off x="283028" y="2759665"/>
+            <a:ext cx="6760029" cy="1625674"/>
+          </a:xfrm>
+          <a:prstGeom prst="rect">
+            <a:avLst/>
+          </a:prstGeom>
+        </p:spPr>
+      </p:pic>
+      <p:sp>
+        <p:nvSpPr>
+          <p:cNvPr id="5" name="Pfeil nach rechts 4"/>
+          <p:cNvSpPr/>
+          <p:nvPr/>
+        </p:nvSpPr>
+        <p:spPr>
+          <a:xfrm rot="10800000">
+            <a:off x="6924362" y="2791470"/>
+            <a:ext cx="1041149" cy="606582"/>
+          </a:xfrm>
+          <a:prstGeom prst="rightArrow">
+            <a:avLst/>
+          </a:prstGeom>
+          <a:solidFill>
+            <a:srgbClr val="FF0000"/>
+          </a:solidFill>
+        </p:spPr>
+        <p:style>
+          <a:lnRef idx="2">
+            <a:schemeClr val="accent1">
+              <a:shade val="50000"/>
+            </a:schemeClr>
+          </a:lnRef>
+          <a:fillRef idx="1">
+            <a:schemeClr val="accent1"/>
+          </a:fillRef>
+          <a:effectRef idx="0">
+            <a:schemeClr val="accent1"/>
+          </a:effectRef>
+          <a:fontRef idx="minor">
+            <a:schemeClr val="lt1"/>
+          </a:fontRef>
+        </p:style>
+        <p:txBody>
+          <a:bodyPr rtlCol="0" anchor="ctr"/>
+          <a:lstStyle/>
+          <a:p>
+            <a:pPr algn="ctr"/>
+            <a:endParaRPr lang="de-DE">
+              <a:solidFill>
+                <a:srgbClr val="FF0000"/>
+              </a:solidFill>
+            </a:endParaRPr>
+          </a:p>
+        </p:txBody>
+      </p:sp>
+      <p:pic>
+        <p:nvPicPr>
+          <p:cNvPr id="7" name="Grafik 6"/>
+          <p:cNvPicPr>
+            <a:picLocks noChangeAspect="1"/>
+          </p:cNvPicPr>
+          <p:nvPr/>
+        </p:nvPicPr>
+        <p:blipFill>
+          <a:blip r:embed="rId3"/>
+          <a:stretch>
+            <a:fillRect/>
+          </a:stretch>
+        </p:blipFill>
+        <p:spPr>
+          <a:xfrm>
+            <a:off x="6327224" y="4492346"/>
+            <a:ext cx="5650365" cy="2152271"/>
+          </a:xfrm>
+          <a:prstGeom prst="rect">
+            <a:avLst/>
+          </a:prstGeom>
+        </p:spPr>
+      </p:pic>
+    </p:spTree>
+    <p:extLst>
+      <p:ext uri="{BB962C8B-B14F-4D97-AF65-F5344CB8AC3E}">
+        <p14:creationId xmlns:p14="http://schemas.microsoft.com/office/powerpoint/2010/main" val="963771656"/>
+      </p:ext>
+    </p:extLst>
+  </p:cSld>
+  <p:clrMapOvr>
+    <a:masterClrMapping/>
+  </p:clrMapOvr>
+  <p:timing>
+    <p:tnLst>
+      <p:par>
+        <p:cTn id="1" dur="indefinite" restart="never" nodeType="tmRoot"/>
+      </p:par>
+    </p:tnLst>
+  </p:timing>
+</p:sld>
+</file>
+
+<file path=ppt/slides/slide22.xml><?xml version="1.0" encoding="utf-8"?>
+<p:sld xmlns:a="http://schemas.openxmlformats.org/drawingml/2006/main" xmlns:r="http://schemas.openxmlformats.org/officeDocument/2006/relationships" xmlns:p="http://schemas.openxmlformats.org/presentationml/2006/main">
+  <p:cSld>
+    <p:spTree>
+      <p:nvGrpSpPr>
+        <p:cNvPr id="1" name=""/>
+        <p:cNvGrpSpPr/>
+        <p:nvPr/>
+      </p:nvGrpSpPr>
+      <p:grpSpPr>
+        <a:xfrm>
+          <a:off x="0" y="0"/>
+          <a:ext cx="0" cy="0"/>
+          <a:chOff x="0" y="0"/>
+          <a:chExt cx="0" cy="0"/>
+        </a:xfrm>
+      </p:grpSpPr>
+      <p:sp>
+        <p:nvSpPr>
+          <p:cNvPr id="2" name="Titel 1"/>
+          <p:cNvSpPr>
+            <a:spLocks noGrp="1"/>
+          </p:cNvSpPr>
+          <p:nvPr>
+            <p:ph type="title"/>
+          </p:nvPr>
+        </p:nvSpPr>
+        <p:spPr/>
+        <p:txBody>
+          <a:bodyPr/>
+          <a:lstStyle/>
+          <a:p>
+            <a:r>
+              <a:rPr lang="de-DE" dirty="0" smtClean="0"/>
+              <a:t>Feed - </a:t>
+            </a:r>
+            <a:r>
+              <a:rPr lang="de-DE" dirty="0" err="1" smtClean="0"/>
+              <a:t>key</a:t>
+            </a:r>
+            <a:endParaRPr lang="de-DE" dirty="0"/>
+          </a:p>
+        </p:txBody>
+      </p:sp>
+      <p:pic>
+        <p:nvPicPr>
+          <p:cNvPr id="4" name="Inhaltsplatzhalter 3"/>
+          <p:cNvPicPr>
+            <a:picLocks noGrp="1" noChangeAspect="1"/>
+          </p:cNvPicPr>
+          <p:nvPr>
+            <p:ph idx="1"/>
+          </p:nvPr>
+        </p:nvPicPr>
+        <p:blipFill>
+          <a:blip r:embed="rId2"/>
+          <a:stretch>
+            <a:fillRect/>
+          </a:stretch>
+        </p:blipFill>
+        <p:spPr>
+          <a:xfrm>
+            <a:off x="218444" y="2993571"/>
+            <a:ext cx="5619889" cy="3478440"/>
+          </a:xfrm>
+          <a:prstGeom prst="rect">
+            <a:avLst/>
+          </a:prstGeom>
+        </p:spPr>
+      </p:pic>
+      <p:sp>
+        <p:nvSpPr>
+          <p:cNvPr id="5" name="Pfeil nach links 4"/>
+          <p:cNvSpPr/>
+          <p:nvPr/>
+        </p:nvSpPr>
+        <p:spPr>
+          <a:xfrm>
+            <a:off x="5718590" y="2852056"/>
+            <a:ext cx="834610" cy="522515"/>
+          </a:xfrm>
+          <a:prstGeom prst="leftArrow">
+            <a:avLst/>
+          </a:prstGeom>
+          <a:solidFill>
+            <a:srgbClr val="FF0000"/>
+          </a:solidFill>
+        </p:spPr>
+        <p:style>
+          <a:lnRef idx="2">
+            <a:schemeClr val="accent1">
+              <a:shade val="50000"/>
+            </a:schemeClr>
+          </a:lnRef>
+          <a:fillRef idx="1">
+            <a:schemeClr val="accent1"/>
+          </a:fillRef>
+          <a:effectRef idx="0">
+            <a:schemeClr val="accent1"/>
+          </a:effectRef>
+          <a:fontRef idx="minor">
+            <a:schemeClr val="lt1"/>
+          </a:fontRef>
+        </p:style>
+        <p:txBody>
+          <a:bodyPr rtlCol="0" anchor="ctr"/>
+          <a:lstStyle/>
+          <a:p>
+            <a:pPr algn="ctr"/>
+            <a:endParaRPr lang="de-DE"/>
+          </a:p>
+        </p:txBody>
+      </p:sp>
+      <p:pic>
+        <p:nvPicPr>
+          <p:cNvPr id="6" name="Grafik 5"/>
+          <p:cNvPicPr>
+            <a:picLocks noChangeAspect="1"/>
+          </p:cNvPicPr>
+          <p:nvPr/>
+        </p:nvPicPr>
+        <p:blipFill>
+          <a:blip r:embed="rId3"/>
+          <a:stretch>
+            <a:fillRect/>
+          </a:stretch>
+        </p:blipFill>
+        <p:spPr>
+          <a:xfrm>
+            <a:off x="6627025" y="2852056"/>
+            <a:ext cx="5426321" cy="1993342"/>
+          </a:xfrm>
+          <a:prstGeom prst="rect">
+            <a:avLst/>
+          </a:prstGeom>
+        </p:spPr>
+      </p:pic>
+    </p:spTree>
+    <p:extLst>
+      <p:ext uri="{BB962C8B-B14F-4D97-AF65-F5344CB8AC3E}">
+        <p14:creationId xmlns:p14="http://schemas.microsoft.com/office/powerpoint/2010/main" val="3086976786"/>
+      </p:ext>
+    </p:extLst>
+  </p:cSld>
+  <p:clrMapOvr>
+    <a:masterClrMapping/>
+  </p:clrMapOvr>
+  <p:timing>
+    <p:tnLst>
+      <p:par>
+        <p:cTn id="1" dur="indefinite" restart="never" nodeType="tmRoot"/>
+      </p:par>
+    </p:tnLst>
+  </p:timing>
+</p:sld>
+</file>
+
+<file path=ppt/slides/slide23.xml><?xml version="1.0" encoding="utf-8"?>
+<p:sld xmlns:a="http://schemas.openxmlformats.org/drawingml/2006/main" xmlns:r="http://schemas.openxmlformats.org/officeDocument/2006/relationships" xmlns:p="http://schemas.openxmlformats.org/presentationml/2006/main">
+  <p:cSld>
+    <p:spTree>
+      <p:nvGrpSpPr>
+        <p:cNvPr id="1" name=""/>
+        <p:cNvGrpSpPr/>
+        <p:nvPr/>
+      </p:nvGrpSpPr>
+      <p:grpSpPr>
+        <a:xfrm>
+          <a:off x="0" y="0"/>
+          <a:ext cx="0" cy="0"/>
+          <a:chOff x="0" y="0"/>
+          <a:chExt cx="0" cy="0"/>
+        </a:xfrm>
+      </p:grpSpPr>
+      <p:sp>
+        <p:nvSpPr>
+          <p:cNvPr id="2" name="Titel 1"/>
+          <p:cNvSpPr>
+            <a:spLocks noGrp="1"/>
+          </p:cNvSpPr>
+          <p:nvPr>
+            <p:ph type="title"/>
+          </p:nvPr>
+        </p:nvSpPr>
+        <p:spPr/>
+        <p:txBody>
+          <a:bodyPr/>
+          <a:lstStyle/>
+          <a:p>
+            <a:r>
               <a:rPr lang="de-DE" dirty="0"/>
               <a:t>Architektur – </a:t>
             </a:r>
@@ -6739,7 +7062,7 @@
 </p:sld>
 </file>
 
-<file path=ppt/slides/slide22.xml><?xml version="1.0" encoding="utf-8"?>
+<file path=ppt/slides/slide24.xml><?xml version="1.0" encoding="utf-8"?>
 <p:sld xmlns:a="http://schemas.openxmlformats.org/drawingml/2006/main" xmlns:r="http://schemas.openxmlformats.org/officeDocument/2006/relationships" xmlns:p="http://schemas.openxmlformats.org/presentationml/2006/main">
   <p:cSld>
     <p:spTree>
@@ -6841,7 +7164,7 @@
 </p:sld>
 </file>
 
-<file path=ppt/slides/slide23.xml><?xml version="1.0" encoding="utf-8"?>
+<file path=ppt/slides/slide25.xml><?xml version="1.0" encoding="utf-8"?>
 <p:sld xmlns:a="http://schemas.openxmlformats.org/drawingml/2006/main" xmlns:r="http://schemas.openxmlformats.org/officeDocument/2006/relationships" xmlns:p="http://schemas.openxmlformats.org/presentationml/2006/main">
   <p:cSld>
     <p:spTree>
@@ -6920,7 +7243,7 @@
 </p:sld>
 </file>
 
-<file path=ppt/slides/slide24.xml><?xml version="1.0" encoding="utf-8"?>
+<file path=ppt/slides/slide26.xml><?xml version="1.0" encoding="utf-8"?>
 <p:sld xmlns:a="http://schemas.openxmlformats.org/drawingml/2006/main" xmlns:r="http://schemas.openxmlformats.org/officeDocument/2006/relationships" xmlns:p="http://schemas.openxmlformats.org/presentationml/2006/main">
   <p:cSld>
     <p:spTree>
@@ -7198,7 +7521,6 @@
               <a:rPr lang="de-DE" dirty="0" smtClean="0"/>
               <a:t>images.google.de/imgres?imgurl=http%3A%2F%2Fwww.radon.com%2Fimages%2Ffigure6.gif&amp;imgrefurl=http%3A%2F%2Fwww.radon.com%2Fradon%2Fradon_analysis.html&amp;h=268&amp;w=337&amp;tbnid=OpSfZ3xZmypDgM%3A&amp;vet=1&amp;docid=NvviVYV6guTSMM&amp;ei=WKwhWKbEJcHlUea2gfgL&amp;tbm=isch&amp;client=firefox-b-ab&amp;iact=rc&amp;uact=3&amp;dur=460&amp;page=0&amp;start=0&amp;ndsp=41&amp;ved=0ahUKEwim0KyA_ZjQAhXBchQKHWZbAL8QMwggKAQwBA&amp;bih=969&amp;biw=1920 08.11.2016 </a:t>
             </a:r>
-            <a:endParaRPr lang="de-DE" dirty="0" smtClean="0"/>
           </a:p>
         </p:txBody>
       </p:sp>
@@ -8036,7 +8358,7 @@
         <p:spPr/>
         <p:txBody>
           <a:bodyPr>
-            <a:normAutofit/>
+            <a:normAutofit fontScale="90000"/>
           </a:bodyPr>
           <a:lstStyle/>
           <a:p>

</xml_diff>